<commit_message>
Added a comment line in multiple linear comparison page
</commit_message>
<xml_diff>
--- a/Project3_ML_v1.9.pptx
+++ b/Project3_ML_v1.9.pptx
@@ -215,7 +215,7 @@
           <a:p>
             <a:fld id="{D24F2F6A-0908-4B61-8FAA-EFDD596235CE}" type="datetimeFigureOut">
               <a:rPr lang="en-US" smtClean="0"/>
-              <a:t>5/9/2019</a:t>
+              <a:t>5/12/2019</a:t>
             </a:fld>
             <a:endParaRPr lang="en-US"/>
           </a:p>
@@ -2144,7 +2144,7 @@
           <a:p>
             <a:fld id="{276D79ED-3FA7-4EF8-964B-EB8BCFAB02F8}" type="datetimeFigureOut">
               <a:rPr lang="en-US" smtClean="0"/>
-              <a:t>5/9/2019</a:t>
+              <a:t>5/12/2019</a:t>
             </a:fld>
             <a:endParaRPr lang="en-US"/>
           </a:p>
@@ -2322,7 +2322,7 @@
           <a:p>
             <a:fld id="{276D79ED-3FA7-4EF8-964B-EB8BCFAB02F8}" type="datetimeFigureOut">
               <a:rPr lang="en-US" smtClean="0"/>
-              <a:t>5/9/2019</a:t>
+              <a:t>5/12/2019</a:t>
             </a:fld>
             <a:endParaRPr lang="en-US"/>
           </a:p>
@@ -2568,7 +2568,7 @@
           <a:p>
             <a:fld id="{276D79ED-3FA7-4EF8-964B-EB8BCFAB02F8}" type="datetimeFigureOut">
               <a:rPr lang="en-US" smtClean="0"/>
-              <a:t>5/9/2019</a:t>
+              <a:t>5/12/2019</a:t>
             </a:fld>
             <a:endParaRPr lang="en-US"/>
           </a:p>
@@ -2799,7 +2799,7 @@
           <a:p>
             <a:fld id="{276D79ED-3FA7-4EF8-964B-EB8BCFAB02F8}" type="datetimeFigureOut">
               <a:rPr lang="en-US" smtClean="0"/>
-              <a:t>5/9/2019</a:t>
+              <a:t>5/12/2019</a:t>
             </a:fld>
             <a:endParaRPr lang="en-US"/>
           </a:p>
@@ -3163,7 +3163,7 @@
           <a:p>
             <a:fld id="{276D79ED-3FA7-4EF8-964B-EB8BCFAB02F8}" type="datetimeFigureOut">
               <a:rPr lang="en-US" smtClean="0"/>
-              <a:t>5/9/2019</a:t>
+              <a:t>5/12/2019</a:t>
             </a:fld>
             <a:endParaRPr lang="en-US"/>
           </a:p>
@@ -3280,7 +3280,7 @@
           <a:p>
             <a:fld id="{276D79ED-3FA7-4EF8-964B-EB8BCFAB02F8}" type="datetimeFigureOut">
               <a:rPr lang="en-US" smtClean="0"/>
-              <a:t>5/9/2019</a:t>
+              <a:t>5/12/2019</a:t>
             </a:fld>
             <a:endParaRPr lang="en-US"/>
           </a:p>
@@ -3375,7 +3375,7 @@
           <a:p>
             <a:fld id="{276D79ED-3FA7-4EF8-964B-EB8BCFAB02F8}" type="datetimeFigureOut">
               <a:rPr lang="en-US" smtClean="0"/>
-              <a:t>5/9/2019</a:t>
+              <a:t>5/12/2019</a:t>
             </a:fld>
             <a:endParaRPr lang="en-US"/>
           </a:p>
@@ -3651,7 +3651,7 @@
           <a:p>
             <a:fld id="{276D79ED-3FA7-4EF8-964B-EB8BCFAB02F8}" type="datetimeFigureOut">
               <a:rPr lang="en-US" smtClean="0"/>
-              <a:t>5/9/2019</a:t>
+              <a:t>5/12/2019</a:t>
             </a:fld>
             <a:endParaRPr lang="en-US"/>
           </a:p>
@@ -3907,7 +3907,7 @@
           <a:p>
             <a:fld id="{276D79ED-3FA7-4EF8-964B-EB8BCFAB02F8}" type="datetimeFigureOut">
               <a:rPr lang="en-US" smtClean="0"/>
-              <a:t>5/9/2019</a:t>
+              <a:t>5/12/2019</a:t>
             </a:fld>
             <a:endParaRPr lang="en-US"/>
           </a:p>
@@ -4126,7 +4126,7 @@
             <a:fld id="{276D79ED-3FA7-4EF8-964B-EB8BCFAB02F8}" type="datetimeFigureOut">
               <a:rPr lang="en-US" smtClean="0"/>
               <a:pPr/>
-              <a:t>5/9/2019</a:t>
+              <a:t>5/12/2019</a:t>
             </a:fld>
             <a:endParaRPr lang="en-US"/>
           </a:p>
@@ -7953,6 +7953,80 @@
           </a:prstGeom>
         </p:spPr>
       </p:pic>
+      <p:sp>
+        <p:nvSpPr>
+          <p:cNvPr id="2" name="Rectangle 1">
+            <a:extLst>
+              <a:ext uri="{FF2B5EF4-FFF2-40B4-BE49-F238E27FC236}">
+                <a16:creationId xmlns:a16="http://schemas.microsoft.com/office/drawing/2014/main" id="{F115EBD2-3CC7-434F-B2BA-FDF24BCFBEC9}"/>
+              </a:ext>
+            </a:extLst>
+          </p:cNvPr>
+          <p:cNvSpPr/>
+          <p:nvPr/>
+        </p:nvSpPr>
+        <p:spPr>
+          <a:xfrm>
+            <a:off x="4059074" y="1542051"/>
+            <a:ext cx="6862776" cy="461665"/>
+          </a:xfrm>
+          <a:prstGeom prst="rect">
+            <a:avLst/>
+          </a:prstGeom>
+        </p:spPr>
+        <p:txBody>
+          <a:bodyPr wrap="none">
+            <a:spAutoFit/>
+          </a:bodyPr>
+          <a:lstStyle/>
+          <a:p>
+            <a:r>
+              <a:rPr lang="en-US" sz="2400" b="1" dirty="0" err="1">
+                <a:solidFill>
+                  <a:srgbClr val="E05A5A"/>
+                </a:solidFill>
+                <a:latin typeface="+mj-lt"/>
+                <a:ea typeface="+mj-ea"/>
+                <a:cs typeface="+mj-cs"/>
+              </a:rPr>
+              <a:t>Assumption</a:t>
+            </a:r>
+            <a:r>
+              <a:rPr lang="en-US" altLang="ja-JP" sz="2400" b="1" dirty="0" err="1">
+                <a:solidFill>
+                  <a:srgbClr val="E05A5A"/>
+                </a:solidFill>
+                <a:latin typeface="+mj-lt"/>
+                <a:ea typeface="+mj-ea"/>
+                <a:cs typeface="+mj-cs"/>
+              </a:rPr>
+              <a:t>Ⅲ:</a:t>
+            </a:r>
+            <a:r>
+              <a:rPr lang="en-US" sz="2400" b="1" dirty="0" err="1">
+                <a:solidFill>
+                  <a:srgbClr val="E05A5A"/>
+                </a:solidFill>
+                <a:latin typeface="+mj-lt"/>
+                <a:ea typeface="+mj-ea"/>
+                <a:cs typeface="+mj-cs"/>
+              </a:rPr>
+              <a:t>no</a:t>
+            </a:r>
+            <a:r>
+              <a:rPr lang="en-US" sz="2400" b="1" dirty="0">
+                <a:solidFill>
+                  <a:srgbClr val="E05A5A"/>
+                </a:solidFill>
+                <a:latin typeface="+mj-lt"/>
+                <a:ea typeface="+mj-ea"/>
+                <a:cs typeface="+mj-cs"/>
+              </a:rPr>
+              <a:t> significant outlier(normality)</a:t>
+            </a:r>
+          </a:p>
+        </p:txBody>
+      </p:sp>
     </p:spTree>
     <p:extLst>
       <p:ext uri="{BB962C8B-B14F-4D97-AF65-F5344CB8AC3E}">

</xml_diff>